<commit_message>
Start to build out beta use case
</commit_message>
<xml_diff>
--- a/TEChallengeCommonAbstractModels.pptx
+++ b/TEChallengeCommonAbstractModels.pptx
@@ -14,7 +14,7 @@
     <p:sldId id="259" r:id="rId5"/>
     <p:sldId id="260" r:id="rId6"/>
     <p:sldId id="261" r:id="rId7"/>
-    <p:sldId id="262" r:id="rId8"/>
+    <p:sldId id="265" r:id="rId8"/>
     <p:sldId id="263" r:id="rId9"/>
     <p:sldId id="264" r:id="rId10"/>
   </p:sldIdLst>
@@ -216,7 +216,7 @@
           <a:p>
             <a:fld id="{8F755A85-8CA7-429D-9199-7310C15E75F3}" type="datetimeFigureOut">
               <a:rPr lang="en-US" smtClean="0"/>
-              <a:t>9/14/16</a:t>
+              <a:t>10/4/2016</a:t>
             </a:fld>
             <a:endParaRPr lang="en-US"/>
           </a:p>
@@ -557,7 +557,7 @@
     </p:spTree>
     <p:extLst>
       <p:ext uri="{BB962C8B-B14F-4D97-AF65-F5344CB8AC3E}">
-        <p14:creationId xmlns:p14="http://schemas.microsoft.com/office/powerpoint/2010/main" val="682086167"/>
+        <p14:creationId xmlns:p14="http://schemas.microsoft.com/office/powerpoint/2010/main" val="1713816153"/>
       </p:ext>
     </p:extLst>
   </p:cSld>
@@ -2756,7 +2756,7 @@
           <a:noFill/>
           <a:extLst>
             <a:ext uri="{909E8E84-426E-40dd-AFC4-6F175D3DCCD1}">
-              <a14:hiddenFill xmlns:a14="http://schemas.microsoft.com/office/drawing/2010/main" xmlns="">
+              <a14:hiddenFill xmlns="" xmlns:a14="http://schemas.microsoft.com/office/drawing/2010/main">
                 <a:solidFill>
                   <a:srgbClr val="FFFFFF"/>
                 </a:solidFill>
@@ -3289,13 +3289,6 @@
   <p:clrMapOvr>
     <a:masterClrMapping/>
   </p:clrMapOvr>
-  <p:timing>
-    <p:tnLst>
-      <p:par>
-        <p:cTn id="1" dur="indefinite" restart="never" nodeType="tmRoot"/>
-      </p:par>
-    </p:tnLst>
-  </p:timing>
 </p:sld>
 </file>
 
@@ -3475,13 +3468,6 @@
   <p:clrMapOvr>
     <a:masterClrMapping/>
   </p:clrMapOvr>
-  <p:timing>
-    <p:tnLst>
-      <p:par>
-        <p:cTn id="1" dur="indefinite" restart="never" nodeType="tmRoot"/>
-      </p:par>
-    </p:tnLst>
-  </p:timing>
 </p:sld>
 </file>
 
@@ -6928,13 +6914,6 @@
   <p:clrMapOvr>
     <a:masterClrMapping/>
   </p:clrMapOvr>
-  <p:timing>
-    <p:tnLst>
-      <p:par>
-        <p:cTn id="1" dur="indefinite" restart="never" nodeType="tmRoot"/>
-      </p:par>
-    </p:tnLst>
-  </p:timing>
 </p:sld>
 </file>
 
@@ -7036,13 +7015,6 @@
   <p:clrMapOvr>
     <a:masterClrMapping/>
   </p:clrMapOvr>
-  <p:timing>
-    <p:tnLst>
-      <p:par>
-        <p:cTn id="1" dur="indefinite" restart="never" nodeType="tmRoot"/>
-      </p:par>
-    </p:tnLst>
-  </p:timing>
 </p:sld>
 </file>
 
@@ -7144,13 +7116,6 @@
   <p:clrMapOvr>
     <a:masterClrMapping/>
   </p:clrMapOvr>
-  <p:timing>
-    <p:tnLst>
-      <p:par>
-        <p:cTn id="1" dur="indefinite" restart="never" nodeType="tmRoot"/>
-      </p:par>
-    </p:tnLst>
-  </p:timing>
 </p:sld>
 </file>
 
@@ -8493,13 +8458,6 @@
   <p:clrMapOvr>
     <a:masterClrMapping/>
   </p:clrMapOvr>
-  <p:timing>
-    <p:tnLst>
-      <p:par>
-        <p:cTn id="1" dur="indefinite" restart="never" nodeType="tmRoot"/>
-      </p:par>
-    </p:tnLst>
-  </p:timing>
 </p:sld>
 </file>
 
@@ -11462,10 +11420,10 @@
         </p:nvGrpSpPr>
         <p:grpSpPr>
           <a:xfrm>
-            <a:off x="1576827" y="5117225"/>
-            <a:ext cx="8335654" cy="1380841"/>
-            <a:chOff x="1810933" y="5271618"/>
-            <a:chExt cx="8335654" cy="1380841"/>
+            <a:off x="623452" y="5117225"/>
+            <a:ext cx="9289029" cy="1284208"/>
+            <a:chOff x="857558" y="5271618"/>
+            <a:chExt cx="9289029" cy="1284208"/>
           </a:xfrm>
         </p:grpSpPr>
         <p:sp>
@@ -11476,7 +11434,7 @@
           </p:nvSpPr>
           <p:spPr>
             <a:xfrm>
-              <a:off x="1997033" y="6458357"/>
+              <a:off x="1871048" y="6390574"/>
               <a:ext cx="81159" cy="79237"/>
             </a:xfrm>
             <a:prstGeom prst="hexagon">
@@ -11519,7 +11477,7 @@
           </p:nvSpPr>
           <p:spPr>
             <a:xfrm>
-              <a:off x="1997033" y="6251680"/>
+              <a:off x="908644" y="6106276"/>
               <a:ext cx="101448" cy="68792"/>
             </a:xfrm>
             <a:prstGeom prst="rect">
@@ -11693,7 +11651,7 @@
           </p:nvSpPr>
           <p:spPr>
             <a:xfrm>
-              <a:off x="1951403" y="5868765"/>
+              <a:off x="857558" y="5782484"/>
               <a:ext cx="182607" cy="182607"/>
             </a:xfrm>
             <a:prstGeom prst="diamond">
@@ -11736,7 +11694,7 @@
           </p:nvSpPr>
           <p:spPr>
             <a:xfrm>
-              <a:off x="1971671" y="5577681"/>
+              <a:off x="863325" y="5506425"/>
               <a:ext cx="152172" cy="172489"/>
             </a:xfrm>
             <a:prstGeom prst="parallelogram">
@@ -11888,7 +11846,7 @@
           </p:nvSpPr>
           <p:spPr>
             <a:xfrm>
-              <a:off x="2169769" y="5555958"/>
+              <a:off x="1061423" y="5484702"/>
               <a:ext cx="1274708" cy="253916"/>
             </a:xfrm>
             <a:prstGeom prst="rect">
@@ -11917,7 +11875,7 @@
           </p:nvSpPr>
           <p:spPr>
             <a:xfrm>
-              <a:off x="2166151" y="5869200"/>
+              <a:off x="1072306" y="5782919"/>
               <a:ext cx="1168910" cy="253916"/>
             </a:xfrm>
             <a:prstGeom prst="rect">
@@ -11946,7 +11904,7 @@
           </p:nvSpPr>
           <p:spPr>
             <a:xfrm>
-              <a:off x="2166151" y="6183636"/>
+              <a:off x="1077762" y="6038232"/>
               <a:ext cx="1566454" cy="253916"/>
             </a:xfrm>
             <a:prstGeom prst="rect">
@@ -11975,7 +11933,7 @@
           </p:nvSpPr>
           <p:spPr>
             <a:xfrm>
-              <a:off x="2168152" y="6390849"/>
+              <a:off x="1974802" y="6294216"/>
               <a:ext cx="1338828" cy="261610"/>
             </a:xfrm>
             <a:prstGeom prst="rect">
@@ -12788,6 +12746,35 @@
             </a:p>
           </p:txBody>
         </p:sp>
+        <p:sp>
+          <p:nvSpPr>
+            <p:cNvPr id="137" name="TextBox 136"/>
+            <p:cNvSpPr txBox="1"/>
+            <p:nvPr/>
+          </p:nvSpPr>
+          <p:spPr>
+            <a:xfrm>
+              <a:off x="2572070" y="5484247"/>
+              <a:ext cx="867545" cy="253916"/>
+            </a:xfrm>
+            <a:prstGeom prst="rect">
+              <a:avLst/>
+            </a:prstGeom>
+            <a:noFill/>
+          </p:spPr>
+          <p:txBody>
+            <a:bodyPr wrap="none" rtlCol="0">
+              <a:spAutoFit/>
+            </a:bodyPr>
+            <a:lstStyle/>
+            <a:p>
+              <a:r>
+                <a:rPr lang="en-US" sz="1050" dirty="0"/>
+                <a:t>Bulk Power</a:t>
+              </a:r>
+            </a:p>
+          </p:txBody>
+        </p:sp>
       </p:grpSp>
       <p:sp>
         <p:nvSpPr>
@@ -12798,7 +12785,7 @@
         <p:spPr>
           <a:xfrm>
             <a:off x="398277" y="1096993"/>
-            <a:ext cx="4205980" cy="3754874"/>
+            <a:ext cx="4205980" cy="3970318"/>
           </a:xfrm>
           <a:prstGeom prst="rect">
             <a:avLst/>
@@ -12822,7 +12809,7 @@
           <a:p>
             <a:r>
               <a:rPr lang="en-US" sz="1400" dirty="0"/>
-              <a:t>The distribution system has one uncontrollable load (Resource).</a:t>
+              <a:t>The distribution system has one uncontrollable load (Resource) and one source of bulk power (Resource).</a:t>
             </a:r>
           </a:p>
           <a:p>
@@ -12999,23 +12986,140 @@
           </a:p>
         </p:txBody>
       </p:sp>
+      <p:sp>
+        <p:nvSpPr>
+          <p:cNvPr id="118" name="Diamond 117"/>
+          <p:cNvSpPr/>
+          <p:nvPr/>
+        </p:nvSpPr>
+        <p:spPr>
+          <a:xfrm>
+            <a:off x="4687717" y="2102004"/>
+            <a:ext cx="274320" cy="274320"/>
+          </a:xfrm>
+          <a:prstGeom prst="diamond">
+            <a:avLst/>
+          </a:prstGeom>
+          <a:solidFill>
+            <a:srgbClr val="CC66FF"/>
+          </a:solidFill>
+        </p:spPr>
+        <p:style>
+          <a:lnRef idx="2">
+            <a:schemeClr val="dk1">
+              <a:shade val="50000"/>
+            </a:schemeClr>
+          </a:lnRef>
+          <a:fillRef idx="1">
+            <a:schemeClr val="dk1"/>
+          </a:fillRef>
+          <a:effectRef idx="0">
+            <a:schemeClr val="dk1"/>
+          </a:effectRef>
+          <a:fontRef idx="minor">
+            <a:schemeClr val="lt1"/>
+          </a:fontRef>
+        </p:style>
+        <p:txBody>
+          <a:bodyPr rtlCol="0" anchor="ctr"/>
+          <a:lstStyle/>
+          <a:p>
+            <a:pPr algn="ctr"/>
+            <a:endParaRPr lang="en-US"/>
+          </a:p>
+        </p:txBody>
+      </p:sp>
+      <p:cxnSp>
+        <p:nvCxnSpPr>
+          <p:cNvPr id="119" name="Straight Connector 118"/>
+          <p:cNvCxnSpPr>
+            <a:stCxn id="6" idx="2"/>
+            <a:endCxn id="118" idx="3"/>
+          </p:cNvCxnSpPr>
+          <p:nvPr/>
+        </p:nvCxnSpPr>
+        <p:spPr>
+          <a:xfrm flipH="1">
+            <a:off x="4962037" y="2227083"/>
+            <a:ext cx="273252" cy="12081"/>
+          </a:xfrm>
+          <a:prstGeom prst="line">
+            <a:avLst/>
+          </a:prstGeom>
+          <a:ln>
+            <a:solidFill>
+              <a:srgbClr val="5B9BD5"/>
+            </a:solidFill>
+          </a:ln>
+        </p:spPr>
+        <p:style>
+          <a:lnRef idx="1">
+            <a:schemeClr val="dk1"/>
+          </a:lnRef>
+          <a:fillRef idx="0">
+            <a:schemeClr val="dk1"/>
+          </a:fillRef>
+          <a:effectRef idx="0">
+            <a:schemeClr val="dk1"/>
+          </a:effectRef>
+          <a:fontRef idx="minor">
+            <a:schemeClr val="tx1"/>
+          </a:fontRef>
+        </p:style>
+      </p:cxnSp>
+      <p:sp>
+        <p:nvSpPr>
+          <p:cNvPr id="124" name="Diamond 123"/>
+          <p:cNvSpPr/>
+          <p:nvPr/>
+        </p:nvSpPr>
+        <p:spPr>
+          <a:xfrm>
+            <a:off x="2164210" y="5372867"/>
+            <a:ext cx="185808" cy="185808"/>
+          </a:xfrm>
+          <a:prstGeom prst="diamond">
+            <a:avLst/>
+          </a:prstGeom>
+          <a:solidFill>
+            <a:srgbClr val="CC66FF"/>
+          </a:solidFill>
+        </p:spPr>
+        <p:style>
+          <a:lnRef idx="2">
+            <a:schemeClr val="dk1">
+              <a:shade val="50000"/>
+            </a:schemeClr>
+          </a:lnRef>
+          <a:fillRef idx="1">
+            <a:schemeClr val="dk1"/>
+          </a:fillRef>
+          <a:effectRef idx="0">
+            <a:schemeClr val="dk1"/>
+          </a:effectRef>
+          <a:fontRef idx="minor">
+            <a:schemeClr val="lt1"/>
+          </a:fontRef>
+        </p:style>
+        <p:txBody>
+          <a:bodyPr rtlCol="0" anchor="ctr"/>
+          <a:lstStyle/>
+          <a:p>
+            <a:pPr algn="ctr"/>
+            <a:endParaRPr lang="en-US"/>
+          </a:p>
+        </p:txBody>
+      </p:sp>
     </p:spTree>
     <p:extLst>
       <p:ext uri="{BB962C8B-B14F-4D97-AF65-F5344CB8AC3E}">
-        <p14:creationId xmlns:p14="http://schemas.microsoft.com/office/powerpoint/2010/main" val="1973744722"/>
+        <p14:creationId xmlns:p14="http://schemas.microsoft.com/office/powerpoint/2010/main" val="1801594675"/>
       </p:ext>
     </p:extLst>
   </p:cSld>
   <p:clrMapOvr>
     <a:masterClrMapping/>
   </p:clrMapOvr>
-  <p:timing>
-    <p:tnLst>
-      <p:par>
-        <p:cTn id="1" dur="indefinite" restart="never" nodeType="tmRoot"/>
-      </p:par>
-    </p:tnLst>
-  </p:timing>
 </p:sld>
 </file>
 
@@ -13166,13 +13270,6 @@
   <p:clrMapOvr>
     <a:masterClrMapping/>
   </p:clrMapOvr>
-  <p:timing>
-    <p:tnLst>
-      <p:par>
-        <p:cTn id="1" dur="indefinite" restart="never" nodeType="tmRoot"/>
-      </p:par>
-    </p:tnLst>
-  </p:timing>
 </p:sld>
 </file>
 
@@ -13300,13 +13397,6 @@
   <p:clrMapOvr>
     <a:masterClrMapping/>
   </p:clrMapOvr>
-  <p:timing>
-    <p:tnLst>
-      <p:par>
-        <p:cTn id="1" dur="indefinite" restart="never" nodeType="tmRoot"/>
-      </p:par>
-    </p:tnLst>
-  </p:timing>
 </p:sld>
 </file>
 

</xml_diff>